<commit_message>
add sheet demo 2
</commit_message>
<xml_diff>
--- a/doc/presentations/Probabilistic Library GFS 2 okt 2024.pptx
+++ b/doc/presentations/Probabilistic Library GFS 2 okt 2024.pptx
@@ -5,10 +5,10 @@
     <p:sldMasterId id="2147483648" r:id="rId4"/>
   </p:sldMasterIdLst>
   <p:notesMasterIdLst>
-    <p:notesMasterId r:id="rId16"/>
+    <p:notesMasterId r:id="rId17"/>
   </p:notesMasterIdLst>
   <p:handoutMasterIdLst>
-    <p:handoutMasterId r:id="rId17"/>
+    <p:handoutMasterId r:id="rId18"/>
   </p:handoutMasterIdLst>
   <p:sldIdLst>
     <p:sldId id="299" r:id="rId5"/>
@@ -20,8 +20,9 @@
     <p:sldId id="357" r:id="rId11"/>
     <p:sldId id="358" r:id="rId12"/>
     <p:sldId id="359" r:id="rId13"/>
-    <p:sldId id="341" r:id="rId14"/>
-    <p:sldId id="300" r:id="rId15"/>
+    <p:sldId id="360" r:id="rId14"/>
+    <p:sldId id="341" r:id="rId15"/>
+    <p:sldId id="300" r:id="rId16"/>
   </p:sldIdLst>
   <p:sldSz cx="12192000" cy="6858000"/>
   <p:notesSz cx="6858000" cy="9144000"/>
@@ -11624,7 +11625,7 @@
           <a:p>
             <a:fld id="{10423462-6B27-4736-8FD4-1786EE0BB6CA}" type="datetime1">
               <a:rPr lang="nl-NL" smtClean="0"/>
-              <a:t>1-10-2024</a:t>
+              <a:t>2-10-2024</a:t>
             </a:fld>
             <a:endParaRPr lang="nl-NL"/>
           </a:p>
@@ -15414,7 +15415,7 @@
           <p:cNvPr id="2" name="Title 1">
             <a:extLst>
               <a:ext uri="{FF2B5EF4-FFF2-40B4-BE49-F238E27FC236}">
-                <a16:creationId xmlns:a16="http://schemas.microsoft.com/office/drawing/2014/main" id="{679A5F0D-9B06-4661-87FD-72E5A2ACFBBE}"/>
+                <a16:creationId xmlns:a16="http://schemas.microsoft.com/office/drawing/2014/main" id="{3025C182-D1B0-6615-245D-1CB692AA42F4}"/>
               </a:ext>
             </a:extLst>
           </p:cNvPr>
@@ -15431,10 +15432,9 @@
           <a:lstStyle/>
           <a:p>
             <a:r>
-              <a:rPr lang="en-US" dirty="0"/>
-              <a:t>Using the Probabilistic Library</a:t>
-            </a:r>
-            <a:endParaRPr lang="nl-NL" dirty="0"/>
+              <a:rPr lang="nl-NL" dirty="0"/>
+              <a:t>Demo 2</a:t>
+            </a:r>
           </a:p>
         </p:txBody>
       </p:sp>
@@ -15443,7 +15443,7 @@
           <p:cNvPr id="3" name="Content Placeholder 2">
             <a:extLst>
               <a:ext uri="{FF2B5EF4-FFF2-40B4-BE49-F238E27FC236}">
-                <a16:creationId xmlns:a16="http://schemas.microsoft.com/office/drawing/2014/main" id="{EB0B01D2-AB88-4764-AF47-9D5D7CA3A27B}"/>
+                <a16:creationId xmlns:a16="http://schemas.microsoft.com/office/drawing/2014/main" id="{72574C8B-4F73-CF9F-CD48-3ECD1890C732}"/>
               </a:ext>
             </a:extLst>
           </p:cNvPr>
@@ -15460,50 +15460,77 @@
           <a:lstStyle/>
           <a:p>
             <a:r>
-              <a:rPr lang="en-US" dirty="0"/>
-              <a:t>Wheels available</a:t>
-            </a:r>
+              <a:rPr lang="nl-NL" dirty="0"/>
+              <a:t>JIRA</a:t>
+            </a:r>
+          </a:p>
+          <a:p>
+            <a:r>
+              <a:rPr lang="nl-NL" dirty="0"/>
+              <a:t>Github</a:t>
+            </a:r>
+          </a:p>
+          <a:p>
+            <a:r>
+              <a:rPr lang="nl-NL" dirty="0" err="1"/>
+              <a:t>TeamCity</a:t>
+            </a:r>
+            <a:endParaRPr lang="nl-NL" dirty="0"/>
           </a:p>
           <a:p>
             <a:pPr lvl="1"/>
             <a:r>
-              <a:rPr lang="en-US" dirty="0"/>
-              <a:t>ask us</a:t>
-            </a:r>
-            <a:endParaRPr lang="en-GB" dirty="0"/>
+              <a:rPr lang="nl-NL" dirty="0" err="1"/>
+              <a:t>Sig</a:t>
+            </a:r>
+            <a:r>
+              <a:rPr lang="nl-NL" dirty="0"/>
+              <a:t> </a:t>
+            </a:r>
+            <a:r>
+              <a:rPr lang="nl-NL" dirty="0" err="1"/>
+              <a:t>build</a:t>
+            </a:r>
+            <a:endParaRPr lang="nl-NL" dirty="0"/>
           </a:p>
           <a:p>
             <a:pPr lvl="1"/>
-            <a:endParaRPr lang="en-US" dirty="0"/>
-          </a:p>
-          <a:p>
-            <a:r>
-              <a:rPr lang="en-US" dirty="0"/>
-              <a:t>Pizza course</a:t>
-            </a:r>
+            <a:r>
+              <a:rPr lang="nl-NL" dirty="0"/>
+              <a:t>Code </a:t>
+            </a:r>
+            <a:r>
+              <a:rPr lang="nl-NL" dirty="0" err="1"/>
+              <a:t>coverage</a:t>
+            </a:r>
+            <a:r>
+              <a:rPr lang="nl-NL" dirty="0"/>
+              <a:t> </a:t>
+            </a:r>
+            <a:r>
+              <a:rPr lang="nl-NL" dirty="0" err="1"/>
+              <a:t>build</a:t>
+            </a:r>
+            <a:endParaRPr lang="nl-NL" dirty="0"/>
           </a:p>
           <a:p>
             <a:pPr lvl="1"/>
             <a:r>
-              <a:rPr lang="en-US" dirty="0"/>
-              <a:t>Start of November, to be announced</a:t>
-            </a:r>
-            <a:br>
-              <a:rPr lang="en-US" dirty="0"/>
-            </a:br>
-            <a:endParaRPr lang="en-US" dirty="0"/>
-          </a:p>
-          <a:p>
-            <a:endParaRPr lang="en-US" dirty="0"/>
-          </a:p>
-          <a:p>
-            <a:endParaRPr lang="en-US" dirty="0"/>
-          </a:p>
-          <a:p>
-            <a:pPr marL="0" indent="0">
-              <a:buNone/>
-            </a:pPr>
-            <a:endParaRPr lang="en-US" dirty="0"/>
+              <a:rPr lang="nl-NL" dirty="0"/>
+              <a:t>Treintje voor python </a:t>
+            </a:r>
+            <a:r>
+              <a:rPr lang="nl-NL" dirty="0" err="1"/>
+              <a:t>build</a:t>
+            </a:r>
+            <a:r>
+              <a:rPr lang="nl-NL" dirty="0"/>
+              <a:t>/tests</a:t>
+            </a:r>
+          </a:p>
+          <a:p>
+            <a:pPr lvl="1"/>
+            <a:endParaRPr lang="nl-NL" dirty="0"/>
           </a:p>
         </p:txBody>
       </p:sp>
@@ -15512,7 +15539,7 @@
           <p:cNvPr id="4" name="Date Placeholder 3">
             <a:extLst>
               <a:ext uri="{FF2B5EF4-FFF2-40B4-BE49-F238E27FC236}">
-                <a16:creationId xmlns:a16="http://schemas.microsoft.com/office/drawing/2014/main" id="{994954F2-890A-4CBA-AC9A-D821D45158AE}"/>
+                <a16:creationId xmlns:a16="http://schemas.microsoft.com/office/drawing/2014/main" id="{2D1DD9FF-1EE5-0105-9F10-EA4A882C009C}"/>
               </a:ext>
             </a:extLst>
           </p:cNvPr>
@@ -15528,9 +15555,191 @@
           <a:bodyPr/>
           <a:lstStyle/>
           <a:p>
+            <a:endParaRPr lang="nl-NL"/>
+          </a:p>
+        </p:txBody>
+      </p:sp>
+      <p:sp>
+        <p:nvSpPr>
+          <p:cNvPr id="5" name="Slide Number Placeholder 4">
+            <a:extLst>
+              <a:ext uri="{FF2B5EF4-FFF2-40B4-BE49-F238E27FC236}">
+                <a16:creationId xmlns:a16="http://schemas.microsoft.com/office/drawing/2014/main" id="{A165CE8E-A704-55EA-BE47-06F62FF04B85}"/>
+              </a:ext>
+            </a:extLst>
+          </p:cNvPr>
+          <p:cNvSpPr>
+            <a:spLocks noGrp="1"/>
+          </p:cNvSpPr>
+          <p:nvPr>
+            <p:ph type="sldNum" sz="quarter" idx="12"/>
+          </p:nvPr>
+        </p:nvSpPr>
+        <p:spPr/>
+        <p:txBody>
+          <a:bodyPr/>
+          <a:lstStyle/>
+          <a:p>
+            <a:fld id="{F42B3F14-D836-496B-80A2-23BE75BD68CB}" type="slidenum">
+              <a:rPr lang="nl-NL" smtClean="0"/>
+              <a:t>10</a:t>
+            </a:fld>
+            <a:endParaRPr lang="nl-NL"/>
+          </a:p>
+        </p:txBody>
+      </p:sp>
+    </p:spTree>
+    <p:extLst>
+      <p:ext uri="{BB962C8B-B14F-4D97-AF65-F5344CB8AC3E}">
+        <p14:creationId xmlns:p14="http://schemas.microsoft.com/office/powerpoint/2010/main" val="1561593311"/>
+      </p:ext>
+    </p:extLst>
+  </p:cSld>
+  <p:clrMapOvr>
+    <a:masterClrMapping/>
+  </p:clrMapOvr>
+</p:sld>
+</file>
+
+<file path=ppt/slides/slide11.xml><?xml version="1.0" encoding="utf-8"?>
+<p:sld xmlns:a="http://schemas.openxmlformats.org/drawingml/2006/main" xmlns:r="http://schemas.openxmlformats.org/officeDocument/2006/relationships" xmlns:p="http://schemas.openxmlformats.org/presentationml/2006/main">
+  <p:cSld>
+    <p:spTree>
+      <p:nvGrpSpPr>
+        <p:cNvPr id="1" name=""/>
+        <p:cNvGrpSpPr/>
+        <p:nvPr/>
+      </p:nvGrpSpPr>
+      <p:grpSpPr>
+        <a:xfrm>
+          <a:off x="0" y="0"/>
+          <a:ext cx="0" cy="0"/>
+          <a:chOff x="0" y="0"/>
+          <a:chExt cx="0" cy="0"/>
+        </a:xfrm>
+      </p:grpSpPr>
+      <p:sp>
+        <p:nvSpPr>
+          <p:cNvPr id="2" name="Title 1">
+            <a:extLst>
+              <a:ext uri="{FF2B5EF4-FFF2-40B4-BE49-F238E27FC236}">
+                <a16:creationId xmlns:a16="http://schemas.microsoft.com/office/drawing/2014/main" id="{679A5F0D-9B06-4661-87FD-72E5A2ACFBBE}"/>
+              </a:ext>
+            </a:extLst>
+          </p:cNvPr>
+          <p:cNvSpPr>
+            <a:spLocks noGrp="1"/>
+          </p:cNvSpPr>
+          <p:nvPr>
+            <p:ph type="title"/>
+          </p:nvPr>
+        </p:nvSpPr>
+        <p:spPr/>
+        <p:txBody>
+          <a:bodyPr/>
+          <a:lstStyle/>
+          <a:p>
+            <a:r>
+              <a:rPr lang="en-US" dirty="0"/>
+              <a:t>Using the Probabilistic Library</a:t>
+            </a:r>
+            <a:endParaRPr lang="nl-NL" dirty="0"/>
+          </a:p>
+        </p:txBody>
+      </p:sp>
+      <p:sp>
+        <p:nvSpPr>
+          <p:cNvPr id="3" name="Content Placeholder 2">
+            <a:extLst>
+              <a:ext uri="{FF2B5EF4-FFF2-40B4-BE49-F238E27FC236}">
+                <a16:creationId xmlns:a16="http://schemas.microsoft.com/office/drawing/2014/main" id="{EB0B01D2-AB88-4764-AF47-9D5D7CA3A27B}"/>
+              </a:ext>
+            </a:extLst>
+          </p:cNvPr>
+          <p:cNvSpPr>
+            <a:spLocks noGrp="1"/>
+          </p:cNvSpPr>
+          <p:nvPr>
+            <p:ph idx="1"/>
+          </p:nvPr>
+        </p:nvSpPr>
+        <p:spPr/>
+        <p:txBody>
+          <a:bodyPr/>
+          <a:lstStyle/>
+          <a:p>
+            <a:r>
+              <a:rPr lang="en-US" dirty="0"/>
+              <a:t>Wheels available</a:t>
+            </a:r>
+          </a:p>
+          <a:p>
+            <a:pPr lvl="1"/>
+            <a:r>
+              <a:rPr lang="en-US" dirty="0"/>
+              <a:t>ask us</a:t>
+            </a:r>
+            <a:endParaRPr lang="en-GB" dirty="0"/>
+          </a:p>
+          <a:p>
+            <a:pPr lvl="1"/>
+            <a:endParaRPr lang="en-US" dirty="0"/>
+          </a:p>
+          <a:p>
+            <a:r>
+              <a:rPr lang="en-US" dirty="0"/>
+              <a:t>Pizza course</a:t>
+            </a:r>
+          </a:p>
+          <a:p>
+            <a:pPr lvl="1"/>
+            <a:r>
+              <a:rPr lang="en-US" dirty="0"/>
+              <a:t>Start of November, to be announced</a:t>
+            </a:r>
+            <a:br>
+              <a:rPr lang="en-US" dirty="0"/>
+            </a:br>
+            <a:endParaRPr lang="en-US" dirty="0"/>
+          </a:p>
+          <a:p>
+            <a:endParaRPr lang="en-US" dirty="0"/>
+          </a:p>
+          <a:p>
+            <a:endParaRPr lang="en-US" dirty="0"/>
+          </a:p>
+          <a:p>
+            <a:pPr marL="0" indent="0">
+              <a:buNone/>
+            </a:pPr>
+            <a:endParaRPr lang="en-US" dirty="0"/>
+          </a:p>
+        </p:txBody>
+      </p:sp>
+      <p:sp>
+        <p:nvSpPr>
+          <p:cNvPr id="4" name="Date Placeholder 3">
+            <a:extLst>
+              <a:ext uri="{FF2B5EF4-FFF2-40B4-BE49-F238E27FC236}">
+                <a16:creationId xmlns:a16="http://schemas.microsoft.com/office/drawing/2014/main" id="{994954F2-890A-4CBA-AC9A-D821D45158AE}"/>
+              </a:ext>
+            </a:extLst>
+          </p:cNvPr>
+          <p:cNvSpPr>
+            <a:spLocks noGrp="1"/>
+          </p:cNvSpPr>
+          <p:nvPr>
+            <p:ph type="dt" sz="half" idx="10"/>
+          </p:nvPr>
+        </p:nvSpPr>
+        <p:spPr/>
+        <p:txBody>
+          <a:bodyPr/>
+          <a:lstStyle/>
+          <a:p>
             <a:fld id="{10423462-6B27-4736-8FD4-1786EE0BB6CA}" type="datetime1">
               <a:rPr lang="nl-NL" smtClean="0"/>
-              <a:t>1-10-2024</a:t>
+              <a:t>2-10-2024</a:t>
             </a:fld>
             <a:endParaRPr lang="nl-NL"/>
           </a:p>
@@ -15901,7 +16110,7 @@
 </p:sld>
 </file>
 
-<file path=ppt/slides/slide11.xml><?xml version="1.0" encoding="utf-8"?>
+<file path=ppt/slides/slide12.xml><?xml version="1.0" encoding="utf-8"?>
 <p:sld xmlns:a="http://schemas.openxmlformats.org/drawingml/2006/main" xmlns:r="http://schemas.openxmlformats.org/officeDocument/2006/relationships" xmlns:p="http://schemas.openxmlformats.org/presentationml/2006/main">
   <p:cSld>
     <p:spTree>
@@ -16111,7 +16320,7 @@
             <a:fld id="{F42B3F14-D836-496B-80A2-23BE75BD68CB}" type="slidenum">
               <a:rPr lang="en-GB" smtClean="0"/>
               <a:pPr/>
-              <a:t>11</a:t>
+              <a:t>12</a:t>
             </a:fld>
             <a:endParaRPr lang="en-GB" dirty="0"/>
           </a:p>
@@ -16170,7 +16379,7 @@
         <p:spPr>
           <a:xfrm>
             <a:off x="1260000" y="2268000"/>
-            <a:ext cx="2868380" cy="306000"/>
+            <a:ext cx="8762186" cy="306000"/>
           </a:xfrm>
         </p:spPr>
         <p:txBody>
@@ -16178,9 +16387,22 @@
           <a:lstStyle/>
           <a:p>
             <a:r>
+              <a:rPr lang="en-GB" dirty="0">
+                <a:hlinkClick r:id="rId3"/>
+              </a:rPr>
+              <a:t>rob.brinkman@deltares.nl</a:t>
+            </a:r>
+            <a:r>
               <a:rPr lang="en-GB" dirty="0"/>
-              <a:t>rob.brinkman@deltares.nl</a:t>
-            </a:r>
+              <a:t> , </a:t>
+            </a:r>
+            <a:r>
+              <a:rPr lang="en-GB" dirty="0">
+                <a:hlinkClick r:id="rId4"/>
+              </a:rPr>
+              <a:t>edwin.spee@deltares.nl</a:t>
+            </a:r>
+            <a:endParaRPr lang="en-GB" dirty="0"/>
           </a:p>
         </p:txBody>
       </p:sp>
@@ -16436,13 +16658,13 @@
           <a:p>
             <a:r>
               <a:rPr lang="en-GB" dirty="0"/>
-              <a:t>Edwin Spee</a:t>
+              <a:t>Edwin Spee		Karolina Wojciechowska</a:t>
             </a:r>
           </a:p>
           <a:p>
             <a:r>
               <a:rPr lang="en-GB" dirty="0"/>
-              <a:t>Rob Brinkman</a:t>
+              <a:t>Rob Brinkman	Arjen Markus</a:t>
             </a:r>
           </a:p>
         </p:txBody>
@@ -16493,7 +16715,18 @@
           <a:bodyPr/>
           <a:lstStyle/>
           <a:p>
-            <a:endParaRPr lang="en-GB" dirty="0"/>
+            <a:r>
+              <a:rPr lang="en-GB" dirty="0"/>
+              <a:t>2 </a:t>
+            </a:r>
+            <a:r>
+              <a:rPr lang="en-GB" dirty="0" err="1"/>
+              <a:t>oktober</a:t>
+            </a:r>
+            <a:r>
+              <a:rPr lang="en-GB" dirty="0"/>
+              <a:t> 2024</a:t>
+            </a:r>
           </a:p>
         </p:txBody>
       </p:sp>
@@ -28704,7 +28937,7 @@
           <a:p>
             <a:r>
               <a:rPr lang="en-US" dirty="0"/>
-              <a:t>Demo</a:t>
+              <a:t>Demo 1</a:t>
             </a:r>
           </a:p>
         </p:txBody>
@@ -28745,10 +28978,9 @@
           <a:p>
             <a:pPr lvl="1"/>
             <a:r>
-              <a:rPr lang="en-US" dirty="0" err="1"/>
-              <a:t>Hydraring</a:t>
-            </a:r>
-            <a:endParaRPr lang="en-US" dirty="0"/>
+              <a:rPr lang="en-US" dirty="0"/>
+              <a:t>Hydra-Ring</a:t>
+            </a:r>
           </a:p>
           <a:p>
             <a:pPr lvl="1"/>
@@ -29610,6 +29842,17 @@
 </file>
 
 <file path=customXml/item1.xml><?xml version="1.0" encoding="utf-8"?>
+<p:properties xmlns:p="http://schemas.microsoft.com/office/2006/metadata/properties" xmlns:xsi="http://www.w3.org/2001/XMLSchema-instance" xmlns:pc="http://schemas.microsoft.com/office/infopath/2007/PartnerControls">
+  <documentManagement>
+    <TaxCatchAll xmlns="58dc3081-d8a1-4e92-884a-04f6ca0fc63f"/>
+    <TaxKeywordTaxHTField xmlns="9dc10479-9fe1-482d-8b13-fa9fc147c365">
+      <Terms xmlns="http://schemas.microsoft.com/office/infopath/2007/PartnerControls"/>
+    </TaxKeywordTaxHTField>
+  </documentManagement>
+</p:properties>
+</file>
+
+<file path=customXml/item2.xml><?xml version="1.0" encoding="utf-8"?>
 <ct:contentTypeSchema xmlns:ct="http://schemas.microsoft.com/office/2006/metadata/contentType" xmlns:ma="http://schemas.microsoft.com/office/2006/metadata/properties/metaAttributes" ct:_="" ma:_="" ma:contentTypeName="Document" ma:contentTypeID="0x01010080ECBE09418E094297756BB7D28E2B2D" ma:contentTypeVersion="13" ma:contentTypeDescription="Een nieuw document maken." ma:contentTypeScope="" ma:versionID="43c57db1ef9d2047f0afe528fe94cd7b">
   <xsd:schema xmlns:xsd="http://www.w3.org/2001/XMLSchema" xmlns:xs="http://www.w3.org/2001/XMLSchema" xmlns:p="http://schemas.microsoft.com/office/2006/metadata/properties" xmlns:ns2="5db5d4ef-9fd2-45ea-8e34-77d63cce28d8" xmlns:ns3="9dc10479-9fe1-482d-8b13-fa9fc147c365" xmlns:ns4="58dc3081-d8a1-4e92-884a-04f6ca0fc63f" targetNamespace="http://schemas.microsoft.com/office/2006/metadata/properties" ma:root="true" ma:fieldsID="752a5c63f437750ef2cedcd6166ab022" ns2:_="" ns3:_="" ns4:_="">
     <xsd:import namespace="5db5d4ef-9fd2-45ea-8e34-77d63cce28d8"/>
@@ -29831,17 +30074,6 @@
 </ct:contentTypeSchema>
 </file>
 
-<file path=customXml/item2.xml><?xml version="1.0" encoding="utf-8"?>
-<p:properties xmlns:p="http://schemas.microsoft.com/office/2006/metadata/properties" xmlns:xsi="http://www.w3.org/2001/XMLSchema-instance" xmlns:pc="http://schemas.microsoft.com/office/infopath/2007/PartnerControls">
-  <documentManagement>
-    <TaxCatchAll xmlns="58dc3081-d8a1-4e92-884a-04f6ca0fc63f"/>
-    <TaxKeywordTaxHTField xmlns="9dc10479-9fe1-482d-8b13-fa9fc147c365">
-      <Terms xmlns="http://schemas.microsoft.com/office/infopath/2007/PartnerControls"/>
-    </TaxKeywordTaxHTField>
-  </documentManagement>
-</p:properties>
-</file>
-
 <file path=customXml/item3.xml><?xml version="1.0" encoding="utf-8"?>
 <?mso-contentType ?>
 <FormTemplates xmlns="http://schemas.microsoft.com/sharepoint/v3/contenttype/forms">
@@ -29852,6 +30084,17 @@
 </file>
 
 <file path=customXml/itemProps1.xml><?xml version="1.0" encoding="utf-8"?>
+<ds:datastoreItem xmlns:ds="http://schemas.openxmlformats.org/officeDocument/2006/customXml" ds:itemID="{BADF6626-F3CA-4DB6-97F3-50ACA793C97C}">
+  <ds:schemaRefs>
+    <ds:schemaRef ds:uri="http://schemas.microsoft.com/office/2006/metadata/properties"/>
+    <ds:schemaRef ds:uri="http://schemas.microsoft.com/office/infopath/2007/PartnerControls"/>
+    <ds:schemaRef ds:uri="58dc3081-d8a1-4e92-884a-04f6ca0fc63f"/>
+    <ds:schemaRef ds:uri="9dc10479-9fe1-482d-8b13-fa9fc147c365"/>
+  </ds:schemaRefs>
+</ds:datastoreItem>
+</file>
+
+<file path=customXml/itemProps2.xml><?xml version="1.0" encoding="utf-8"?>
 <ds:datastoreItem xmlns:ds="http://schemas.openxmlformats.org/officeDocument/2006/customXml" ds:itemID="{1D7632B3-E712-4A5A-BFB2-E82A8574828D}">
   <ds:schemaRefs>
     <ds:schemaRef ds:uri="http://schemas.microsoft.com/office/2006/metadata/contentType"/>
@@ -29871,17 +30114,6 @@
 </ds:datastoreItem>
 </file>
 
-<file path=customXml/itemProps2.xml><?xml version="1.0" encoding="utf-8"?>
-<ds:datastoreItem xmlns:ds="http://schemas.openxmlformats.org/officeDocument/2006/customXml" ds:itemID="{BADF6626-F3CA-4DB6-97F3-50ACA793C97C}">
-  <ds:schemaRefs>
-    <ds:schemaRef ds:uri="http://schemas.microsoft.com/office/2006/metadata/properties"/>
-    <ds:schemaRef ds:uri="http://schemas.microsoft.com/office/infopath/2007/PartnerControls"/>
-    <ds:schemaRef ds:uri="58dc3081-d8a1-4e92-884a-04f6ca0fc63f"/>
-    <ds:schemaRef ds:uri="9dc10479-9fe1-482d-8b13-fa9fc147c365"/>
-  </ds:schemaRefs>
-</ds:datastoreItem>
-</file>
-
 <file path=customXml/itemProps3.xml><?xml version="1.0" encoding="utf-8"?>
 <ds:datastoreItem xmlns:ds="http://schemas.openxmlformats.org/officeDocument/2006/customXml" ds:itemID="{3BF049C5-34FC-4054-9737-0DAA15D8F6B6}">
   <ds:schemaRefs>

</xml_diff>